<commit_message>
Adding economic data example
</commit_message>
<xml_diff>
--- a/lectures/04 Functions/images/Calling Functions.pptx
+++ b/lectures/04 Functions/images/Calling Functions.pptx
@@ -3061,7 +3061,7 @@
         </p:nvSpPr>
         <p:spPr>
           <a:xfrm>
-            <a:off x="2979177" y="327224"/>
+            <a:off x="2979177" y="917533"/>
             <a:ext cx="3819221" cy="2232586"/>
           </a:xfrm>
           <a:prstGeom prst="roundRect">
@@ -3110,7 +3110,7 @@
         </p:nvSpPr>
         <p:spPr>
           <a:xfrm>
-            <a:off x="4090675" y="1443979"/>
+            <a:off x="4090675" y="2034288"/>
             <a:ext cx="1481560" cy="937549"/>
           </a:xfrm>
           <a:prstGeom prst="roundRect">
@@ -3166,7 +3166,7 @@
         </p:nvSpPr>
         <p:spPr>
           <a:xfrm>
-            <a:off x="3198045" y="586977"/>
+            <a:off x="3198045" y="1177286"/>
             <a:ext cx="1047158" cy="476541"/>
           </a:xfrm>
           <a:prstGeom prst="roundRect">
@@ -3215,7 +3215,7 @@
         </p:nvSpPr>
         <p:spPr>
           <a:xfrm>
-            <a:off x="4383597" y="584997"/>
+            <a:off x="4383597" y="1175306"/>
             <a:ext cx="1047158" cy="476541"/>
           </a:xfrm>
           <a:prstGeom prst="roundRect">
@@ -3264,7 +3264,7 @@
         </p:nvSpPr>
         <p:spPr>
           <a:xfrm>
-            <a:off x="5640402" y="571142"/>
+            <a:off x="5640402" y="1161451"/>
             <a:ext cx="1047158" cy="476541"/>
           </a:xfrm>
           <a:prstGeom prst="roundRect">
@@ -3313,7 +3313,7 @@
         </p:nvSpPr>
         <p:spPr>
           <a:xfrm>
-            <a:off x="5800871" y="2096671"/>
+            <a:off x="5800871" y="2686980"/>
             <a:ext cx="803425" cy="369332"/>
           </a:xfrm>
           <a:prstGeom prst="rect">
@@ -3348,7 +3348,7 @@
         </p:nvGrpSpPr>
         <p:grpSpPr>
           <a:xfrm>
-            <a:off x="287662" y="3226104"/>
+            <a:off x="287662" y="3816413"/>
             <a:ext cx="2693045" cy="1818929"/>
             <a:chOff x="287662" y="3382463"/>
             <a:chExt cx="2693045" cy="1818929"/>
@@ -3612,7 +3612,7 @@
         </p:nvGrpSpPr>
         <p:grpSpPr>
           <a:xfrm>
-            <a:off x="3593950" y="3226104"/>
+            <a:off x="3593950" y="3816413"/>
             <a:ext cx="2693045" cy="1818929"/>
             <a:chOff x="3717652" y="3285482"/>
             <a:chExt cx="2693045" cy="1818929"/>
@@ -3771,7 +3771,7 @@
         </p:nvGrpSpPr>
         <p:grpSpPr>
           <a:xfrm>
-            <a:off x="6900239" y="3226104"/>
+            <a:off x="6900239" y="3816413"/>
             <a:ext cx="2693045" cy="1818929"/>
             <a:chOff x="6900239" y="3226104"/>
             <a:chExt cx="2693045" cy="1818929"/>
@@ -4026,7 +4026,7 @@
         </p:nvCxnSpPr>
         <p:spPr>
           <a:xfrm flipH="1" flipV="1">
-            <a:off x="3784922" y="1076446"/>
+            <a:off x="3784922" y="1666755"/>
             <a:ext cx="1046533" cy="367533"/>
           </a:xfrm>
           <a:prstGeom prst="straightConnector1">
@@ -4068,7 +4068,7 @@
         </p:nvCxnSpPr>
         <p:spPr>
           <a:xfrm flipV="1">
-            <a:off x="4831455" y="1061538"/>
+            <a:off x="4831455" y="1651847"/>
             <a:ext cx="75721" cy="382441"/>
           </a:xfrm>
           <a:prstGeom prst="straightConnector1">
@@ -4109,7 +4109,7 @@
         </p:nvCxnSpPr>
         <p:spPr>
           <a:xfrm flipV="1">
-            <a:off x="4831455" y="1064871"/>
+            <a:off x="4831455" y="1655180"/>
             <a:ext cx="1314702" cy="379108"/>
           </a:xfrm>
           <a:prstGeom prst="straightConnector1">
@@ -4151,7 +4151,7 @@
         </p:nvCxnSpPr>
         <p:spPr>
           <a:xfrm flipH="1">
-            <a:off x="1634185" y="2381528"/>
+            <a:off x="1634185" y="2971837"/>
             <a:ext cx="3197270" cy="844576"/>
           </a:xfrm>
           <a:prstGeom prst="straightConnector1">
@@ -4193,7 +4193,7 @@
         </p:nvCxnSpPr>
         <p:spPr>
           <a:xfrm>
-            <a:off x="4831455" y="2381528"/>
+            <a:off x="4831455" y="2971837"/>
             <a:ext cx="109018" cy="844576"/>
           </a:xfrm>
           <a:prstGeom prst="straightConnector1">
@@ -4235,7 +4235,7 @@
         </p:nvCxnSpPr>
         <p:spPr>
           <a:xfrm>
-            <a:off x="4831455" y="2381528"/>
+            <a:off x="4831455" y="2971837"/>
             <a:ext cx="3415307" cy="844576"/>
           </a:xfrm>
           <a:prstGeom prst="straightConnector1">

</xml_diff>